<commit_message>
Update Movie Data Exploration.pptx
</commit_message>
<xml_diff>
--- a/Craft a Data Story/Movie Data Exploration.pptx
+++ b/Craft a Data Story/Movie Data Exploration.pptx
@@ -254,7 +254,7 @@
           <a:p>
             <a:fld id="{EED1C14C-A143-42F5-B247-D0E800131009}" type="datetimeFigureOut">
               <a:rPr lang="en-US" smtClean="0"/>
-              <a:t>7/5/2022</a:t>
+              <a:t>7/6/2022</a:t>
             </a:fld>
             <a:endParaRPr lang="en-US"/>
           </a:p>
@@ -541,7 +541,7 @@
           <a:p>
             <a:fld id="{EED1C14C-A143-42F5-B247-D0E800131009}" type="datetimeFigureOut">
               <a:rPr lang="en-US" smtClean="0"/>
-              <a:t>7/5/2022</a:t>
+              <a:t>7/6/2022</a:t>
             </a:fld>
             <a:endParaRPr lang="en-US"/>
           </a:p>
@@ -733,7 +733,7 @@
           <a:p>
             <a:fld id="{EED1C14C-A143-42F5-B247-D0E800131009}" type="datetimeFigureOut">
               <a:rPr lang="en-US" smtClean="0"/>
-              <a:t>7/5/2022</a:t>
+              <a:t>7/6/2022</a:t>
             </a:fld>
             <a:endParaRPr lang="en-US"/>
           </a:p>
@@ -994,7 +994,7 @@
           <a:p>
             <a:fld id="{EED1C14C-A143-42F5-B247-D0E800131009}" type="datetimeFigureOut">
               <a:rPr lang="en-US" smtClean="0"/>
-              <a:t>7/5/2022</a:t>
+              <a:t>7/6/2022</a:t>
             </a:fld>
             <a:endParaRPr lang="en-US"/>
           </a:p>
@@ -1418,7 +1418,7 @@
           <a:p>
             <a:fld id="{EED1C14C-A143-42F5-B247-D0E800131009}" type="datetimeFigureOut">
               <a:rPr lang="en-US" smtClean="0"/>
-              <a:t>7/5/2022</a:t>
+              <a:t>7/6/2022</a:t>
             </a:fld>
             <a:endParaRPr lang="en-US"/>
           </a:p>
@@ -1964,7 +1964,7 @@
           <a:p>
             <a:fld id="{EED1C14C-A143-42F5-B247-D0E800131009}" type="datetimeFigureOut">
               <a:rPr lang="en-US" smtClean="0"/>
-              <a:t>7/5/2022</a:t>
+              <a:t>7/6/2022</a:t>
             </a:fld>
             <a:endParaRPr lang="en-US"/>
           </a:p>
@@ -2804,7 +2804,7 @@
           <a:p>
             <a:fld id="{EED1C14C-A143-42F5-B247-D0E800131009}" type="datetimeFigureOut">
               <a:rPr lang="en-US" smtClean="0"/>
-              <a:t>7/5/2022</a:t>
+              <a:t>7/6/2022</a:t>
             </a:fld>
             <a:endParaRPr lang="en-US"/>
           </a:p>
@@ -2974,7 +2974,7 @@
           <a:p>
             <a:fld id="{EED1C14C-A143-42F5-B247-D0E800131009}" type="datetimeFigureOut">
               <a:rPr lang="en-US" smtClean="0"/>
-              <a:t>7/5/2022</a:t>
+              <a:t>7/6/2022</a:t>
             </a:fld>
             <a:endParaRPr lang="en-US"/>
           </a:p>
@@ -3158,7 +3158,7 @@
           <a:p>
             <a:fld id="{EED1C14C-A143-42F5-B247-D0E800131009}" type="datetimeFigureOut">
               <a:rPr lang="en-US" smtClean="0"/>
-              <a:t>7/5/2022</a:t>
+              <a:t>7/6/2022</a:t>
             </a:fld>
             <a:endParaRPr lang="en-US"/>
           </a:p>
@@ -3328,7 +3328,7 @@
           <a:p>
             <a:fld id="{EED1C14C-A143-42F5-B247-D0E800131009}" type="datetimeFigureOut">
               <a:rPr lang="en-US" smtClean="0"/>
-              <a:t>7/5/2022</a:t>
+              <a:t>7/6/2022</a:t>
             </a:fld>
             <a:endParaRPr lang="en-US"/>
           </a:p>
@@ -3576,7 +3576,7 @@
           <a:p>
             <a:fld id="{EED1C14C-A143-42F5-B247-D0E800131009}" type="datetimeFigureOut">
               <a:rPr lang="en-US" smtClean="0"/>
-              <a:t>7/5/2022</a:t>
+              <a:t>7/6/2022</a:t>
             </a:fld>
             <a:endParaRPr lang="en-US"/>
           </a:p>
@@ -3813,7 +3813,7 @@
           <a:p>
             <a:fld id="{EED1C14C-A143-42F5-B247-D0E800131009}" type="datetimeFigureOut">
               <a:rPr lang="en-US" smtClean="0"/>
-              <a:t>7/5/2022</a:t>
+              <a:t>7/6/2022</a:t>
             </a:fld>
             <a:endParaRPr lang="en-US"/>
           </a:p>
@@ -4186,7 +4186,7 @@
           <a:p>
             <a:fld id="{EED1C14C-A143-42F5-B247-D0E800131009}" type="datetimeFigureOut">
               <a:rPr lang="en-US" smtClean="0"/>
-              <a:t>7/5/2022</a:t>
+              <a:t>7/6/2022</a:t>
             </a:fld>
             <a:endParaRPr lang="en-US"/>
           </a:p>
@@ -4304,7 +4304,7 @@
           <a:p>
             <a:fld id="{EED1C14C-A143-42F5-B247-D0E800131009}" type="datetimeFigureOut">
               <a:rPr lang="en-US" smtClean="0"/>
-              <a:t>7/5/2022</a:t>
+              <a:t>7/6/2022</a:t>
             </a:fld>
             <a:endParaRPr lang="en-US"/>
           </a:p>
@@ -4399,7 +4399,7 @@
           <a:p>
             <a:fld id="{EED1C14C-A143-42F5-B247-D0E800131009}" type="datetimeFigureOut">
               <a:rPr lang="en-US" smtClean="0"/>
-              <a:t>7/5/2022</a:t>
+              <a:t>7/6/2022</a:t>
             </a:fld>
             <a:endParaRPr lang="en-US"/>
           </a:p>
@@ -4650,7 +4650,7 @@
           <a:p>
             <a:fld id="{EED1C14C-A143-42F5-B247-D0E800131009}" type="datetimeFigureOut">
               <a:rPr lang="en-US" smtClean="0"/>
-              <a:t>7/5/2022</a:t>
+              <a:t>7/6/2022</a:t>
             </a:fld>
             <a:endParaRPr lang="en-US"/>
           </a:p>
@@ -4937,7 +4937,7 @@
           <a:p>
             <a:fld id="{EED1C14C-A143-42F5-B247-D0E800131009}" type="datetimeFigureOut">
               <a:rPr lang="en-US" smtClean="0"/>
-              <a:t>7/5/2022</a:t>
+              <a:t>7/6/2022</a:t>
             </a:fld>
             <a:endParaRPr lang="en-US"/>
           </a:p>
@@ -5150,7 +5150,7 @@
           <a:p>
             <a:fld id="{EED1C14C-A143-42F5-B247-D0E800131009}" type="datetimeFigureOut">
               <a:rPr lang="en-US" smtClean="0"/>
-              <a:t>7/5/2022</a:t>
+              <a:t>7/6/2022</a:t>
             </a:fld>
             <a:endParaRPr lang="en-US"/>
           </a:p>
@@ -5891,18 +5891,26 @@
           </a:xfrm>
         </p:spPr>
         <p:txBody>
-          <a:bodyPr/>
+          <a:bodyPr>
+            <a:normAutofit fontScale="92500" lnSpcReduction="20000"/>
+          </a:bodyPr>
           <a:lstStyle/>
           <a:p>
             <a:r>
               <a:rPr lang="en-US" dirty="0"/>
-              <a:t>Optimize movie and TV show decisions to generate revenue</a:t>
+              <a:t>What are some traits we can glean from some basic movie and TV show data?</a:t>
             </a:r>
           </a:p>
           <a:p>
             <a:r>
               <a:rPr lang="en-US" dirty="0"/>
-              <a:t>Utilize IMDB and TMDB score as sign of “successful movie/show”</a:t>
+              <a:t>How can we optimize movie and TV show decisions to generate revenue</a:t>
+            </a:r>
+          </a:p>
+          <a:p>
+            <a:r>
+              <a:rPr lang="en-US" dirty="0"/>
+              <a:t>Utilizing IMDB and TMDB score as sign of “successful movie/show”</a:t>
             </a:r>
           </a:p>
           <a:p>

</xml_diff>